<commit_message>
Update Foley Wants his Classifier Back.pptx
</commit_message>
<xml_diff>
--- a/21-25 rounds/Foley Wants His Classifier Back - 24 Rounds - VA Count/Foley Wants his Classifier Back.pptx
+++ b/21-25 rounds/Foley Wants His Classifier Back - 24 Rounds - VA Count/Foley Wants his Classifier Back.pptx
@@ -258,7 +258,7 @@
               <a:pPr>
                 <a:defRPr/>
               </a:pPr>
-              <a:t>4/23/2019</a:t>
+              <a:t>4/24/2019</a:t>
             </a:fld>
             <a:endParaRPr lang="en-US"/>
           </a:p>
@@ -4159,7 +4159,7 @@
           <p:nvPr>
             <p:extLst>
               <p:ext uri="{D42A27DB-BD31-4B8C-83A1-F6EECF244321}">
-                <p14:modId xmlns:p14="http://schemas.microsoft.com/office/powerpoint/2010/main" val="1508708037"/>
+                <p14:modId xmlns:p14="http://schemas.microsoft.com/office/powerpoint/2010/main" val="2232847352"/>
               </p:ext>
             </p:extLst>
           </p:nvPr>
@@ -4981,7 +4981,7 @@
                           <a:ea typeface="ＭＳ Ｐゴシック" pitchFamily="-112" charset="-128"/>
                           <a:cs typeface="Times New Roman" pitchFamily="-112" charset="0"/>
                         </a:rPr>
-                        <a:t>RULES: Targets are designated from left to right as T1-T6</a:t>
+                        <a:t>RULES: Targets are designated from left to right as T1-T6. Failure to switch to shoot strong/weak hand only after the reload will be a procedural per shot fired.</a:t>
                       </a:r>
                     </a:p>
                   </a:txBody>

</xml_diff>

<commit_message>
Updated the stage and did some cleanup.
</commit_message>
<xml_diff>
--- a/21-25 rounds/Foley Wants His Classifier Back - 24 Rounds - VA Count/Foley Wants his Classifier Back.pptx
+++ b/21-25 rounds/Foley Wants His Classifier Back - 24 Rounds - VA Count/Foley Wants his Classifier Back.pptx
@@ -258,7 +258,7 @@
               <a:pPr>
                 <a:defRPr/>
               </a:pPr>
-              <a:t>4/24/2019</a:t>
+              <a:t>4/26/2019</a:t>
             </a:fld>
             <a:endParaRPr lang="en-US"/>
           </a:p>
@@ -4159,7 +4159,7 @@
           <p:nvPr>
             <p:extLst>
               <p:ext uri="{D42A27DB-BD31-4B8C-83A1-F6EECF244321}">
-                <p14:modId xmlns:p14="http://schemas.microsoft.com/office/powerpoint/2010/main" val="2232847352"/>
+                <p14:modId xmlns:p14="http://schemas.microsoft.com/office/powerpoint/2010/main" val="151529903"/>
               </p:ext>
             </p:extLst>
           </p:nvPr>
@@ -4546,20 +4546,17 @@
                           <a:ea typeface="ＭＳ Ｐゴシック" pitchFamily="-112" charset="-128"/>
                           <a:cs typeface="Times New Roman" pitchFamily="-112" charset="0"/>
                         </a:rPr>
-                        <a:t>START POSITION : </a:t>
+                        <a:t>START POSITION : String 1: Standing both feet on X’s. String 2: Standing anywhere in Box A</a:t>
                       </a:r>
-                      <a:r>
-                        <a:rPr lang="en-US" sz="1100" b="1" i="0" u="none" strike="noStrike" kern="1200" cap="none" spc="0" baseline="0" dirty="0">
-                          <a:solidFill>
-                            <a:srgbClr val="000000"/>
-                          </a:solidFill>
-                          <a:uFillTx/>
-                          <a:latin typeface="Arial" pitchFamily="34"/>
-                          <a:ea typeface="Arial" pitchFamily="34"/>
-                          <a:cs typeface="Arial" pitchFamily="34"/>
-                        </a:rPr>
-                        <a:t>Standing with both feet on X’s</a:t>
-                      </a:r>
+                      <a:endParaRPr lang="en-US" sz="1100" b="1" i="0" u="none" strike="noStrike" kern="1200" cap="none" spc="0" baseline="0" dirty="0">
+                        <a:solidFill>
+                          <a:srgbClr val="000000"/>
+                        </a:solidFill>
+                        <a:uFillTx/>
+                        <a:latin typeface="Arial" pitchFamily="34"/>
+                        <a:ea typeface="Arial" pitchFamily="34"/>
+                        <a:cs typeface="Arial" pitchFamily="34"/>
+                      </a:endParaRPr>
                     </a:p>
                     <a:p>
                       <a:pPr marL="0" marR="0" lvl="0" indent="0" algn="l" defTabSz="966788" rtl="0" eaLnBrk="1" fontAlgn="base" latinLnBrk="0" hangingPunct="1">
@@ -5150,7 +5147,7 @@
                           <a:ea typeface="ＭＳ Ｐゴシック" pitchFamily="-112" charset="-128"/>
                           <a:cs typeface="Times New Roman" pitchFamily="-112" charset="0"/>
                         </a:rPr>
-                        <a:t>String 2: Move to shooting box A and engage T1-3 with 2 rounds each freestyle then make a mandatory reload and engage T4-6 with two rounds each weak hand only</a:t>
+                        <a:t>String 2: Move to shooting box B and engage T1-3 with 2 rounds each freestyle then make a mandatory reload and engage T4-6 with two rounds each weak hand only</a:t>
                       </a:r>
                     </a:p>
                   </a:txBody>
@@ -5345,8 +5342,8 @@
         </p:blipFill>
         <p:spPr>
           <a:xfrm>
-            <a:off x="2269968" y="4099176"/>
-            <a:ext cx="2421494" cy="5393959"/>
+            <a:off x="2446853" y="3942019"/>
+            <a:ext cx="2731976" cy="5496867"/>
           </a:xfrm>
           <a:prstGeom prst="rect">
             <a:avLst/>

</xml_diff>